<commit_message>
4 - update pptx
</commit_message>
<xml_diff>
--- a/pycharm-github.pptx
+++ b/pycharm-github.pptx
@@ -107,6 +107,11 @@
       </a:defRPr>
     </a:lvl9pPr>
   </p:defaultTextStyle>
+  <p:extLst>
+    <p:ext uri="{EFAFB233-063F-42B5-8137-9DF3F51BA10A}">
+      <p15:sldGuideLst xmlns:p15="http://schemas.microsoft.com/office/powerpoint/2012/main"/>
+    </p:ext>
+  </p:extLst>
 </p:presentation>
 </file>
 
@@ -11721,9 +11726,12 @@
           <a:lstStyle/>
           <a:p>
             <a:r>
-              <a:rPr lang="pl-PL" dirty="0"/>
+              <a:rPr lang="pl-PL" dirty="0">
+                <a:hlinkClick r:id="rId2"/>
+              </a:rPr>
               <a:t>https://drive.google.com/file/d/19USLUIuSvcYKpZIXI0yfl_Pst-jGvD_u/view?usp=drive_link</a:t>
             </a:r>
+            <a:endParaRPr lang="pl-PL" dirty="0"/>
           </a:p>
         </p:txBody>
       </p:sp>
@@ -11785,7 +11793,7 @@
               <a:buNone/>
             </a:pPr>
             <a:r>
-              <a:rPr lang="pl-PL" sz="3300" b="0" strike="noStrike" spc="-1">
+              <a:rPr lang="pl-PL" sz="3300" b="0" strike="noStrike" spc="-1" dirty="0">
                 <a:latin typeface="Arial"/>
               </a:rPr>
               <a:t>Komendy	</a:t>
@@ -11834,10 +11842,34 @@
               <a:buChar char=""/>
             </a:pPr>
             <a:r>
-              <a:rPr lang="pl-PL" sz="2400" b="0" strike="noStrike" spc="-1">
+              <a:rPr lang="pl-PL" sz="2400" b="0" strike="noStrike" spc="-1" dirty="0">
                 <a:latin typeface="Arial"/>
               </a:rPr>
-              <a:t>git config --global user.name "Radek"</a:t>
+              <a:t>git </a:t>
+            </a:r>
+            <a:r>
+              <a:rPr lang="pl-PL" sz="2400" b="0" strike="noStrike" spc="-1" dirty="0" err="1">
+                <a:latin typeface="Arial"/>
+              </a:rPr>
+              <a:t>config</a:t>
+            </a:r>
+            <a:r>
+              <a:rPr lang="pl-PL" sz="2400" b="0" strike="noStrike" spc="-1" dirty="0">
+                <a:latin typeface="Arial"/>
+              </a:rPr>
+              <a:t> --</a:t>
+            </a:r>
+            <a:r>
+              <a:rPr lang="pl-PL" sz="2400" b="0" strike="noStrike" spc="-1" dirty="0" err="1">
+                <a:latin typeface="Arial"/>
+              </a:rPr>
+              <a:t>global</a:t>
+            </a:r>
+            <a:r>
+              <a:rPr lang="pl-PL" sz="2400" b="0" strike="noStrike" spc="-1" dirty="0">
+                <a:latin typeface="Arial"/>
+              </a:rPr>
+              <a:t> user.name "Radek"</a:t>
             </a:r>
           </a:p>
           <a:p>
@@ -11853,10 +11885,46 @@
               <a:buChar char=""/>
             </a:pPr>
             <a:r>
-              <a:rPr lang="pl-PL" sz="2400" b="0" strike="noStrike" spc="-1">
+              <a:rPr lang="pl-PL" sz="2400" b="0" strike="noStrike" spc="-1" dirty="0">
                 <a:latin typeface="Arial"/>
               </a:rPr>
-              <a:t>git config --global user.email "Radek@com.pl"</a:t>
+              <a:t>git </a:t>
+            </a:r>
+            <a:r>
+              <a:rPr lang="pl-PL" sz="2400" b="0" strike="noStrike" spc="-1" dirty="0" err="1">
+                <a:latin typeface="Arial"/>
+              </a:rPr>
+              <a:t>config</a:t>
+            </a:r>
+            <a:r>
+              <a:rPr lang="pl-PL" sz="2400" b="0" strike="noStrike" spc="-1" dirty="0">
+                <a:latin typeface="Arial"/>
+              </a:rPr>
+              <a:t> –</a:t>
+            </a:r>
+            <a:r>
+              <a:rPr lang="pl-PL" sz="2400" b="0" strike="noStrike" spc="-1" dirty="0" err="1">
+                <a:latin typeface="Arial"/>
+              </a:rPr>
+              <a:t>globa</a:t>
+            </a:r>
+            <a:r>
+              <a:rPr lang="pl-PL" sz="2400" b="0" strike="noStrike" spc="-1" dirty="0">
+                <a:latin typeface="Arial"/>
+              </a:rPr>
+              <a:t> l </a:t>
+            </a:r>
+            <a:r>
+              <a:rPr lang="pl-PL" sz="2400" b="0" strike="noStrike" spc="-1" dirty="0" err="1">
+                <a:latin typeface="Arial"/>
+              </a:rPr>
+              <a:t>user.email</a:t>
+            </a:r>
+            <a:r>
+              <a:rPr lang="pl-PL" sz="2400" b="0" strike="noStrike" spc="-1" dirty="0">
+                <a:latin typeface="Arial"/>
+              </a:rPr>
+              <a:t> "Radek@com.pl"</a:t>
             </a:r>
           </a:p>
           <a:p>
@@ -11872,7 +11940,7 @@
               <a:buChar char=""/>
             </a:pPr>
             <a:r>
-              <a:rPr lang="pl-PL" sz="2400" b="0" strike="noStrike" spc="-1">
+              <a:rPr lang="pl-PL" sz="2400" b="0" strike="noStrike" spc="-1" dirty="0">
                 <a:latin typeface="Arial"/>
               </a:rPr>
               <a:t>  </a:t>

</xml_diff>